<commit_message>
Update JPMC CCB Risk Modelling Case Study.pptx
</commit_message>
<xml_diff>
--- a/JPMC CCB Risk Modelling Case Study.pptx
+++ b/JPMC CCB Risk Modelling Case Study.pptx
@@ -3047,6 +3047,78 @@
         </a:p>
       </dgm:t>
     </dgm:pt>
+    <dgm:pt modelId="{13C68548-78D4-42EB-8A4E-355ADF5DB3ED}">
+      <dgm:prSet phldrT="[Text]"/>
+      <dgm:spPr/>
+      <dgm:t>
+        <a:bodyPr/>
+        <a:lstStyle/>
+        <a:p>
+          <a:r>
+            <a:rPr lang="en-IN" dirty="0"/>
+            <a:t>Graphs and Plots</a:t>
+          </a:r>
+        </a:p>
+      </dgm:t>
+    </dgm:pt>
+    <dgm:pt modelId="{FD04A5A8-D653-414C-9CB2-871AD466BB26}" type="parTrans" cxnId="{EF358AFE-C887-4F32-A138-762069FFB118}">
+      <dgm:prSet/>
+      <dgm:spPr/>
+      <dgm:t>
+        <a:bodyPr/>
+        <a:lstStyle/>
+        <a:p>
+          <a:endParaRPr lang="en-IN"/>
+        </a:p>
+      </dgm:t>
+    </dgm:pt>
+    <dgm:pt modelId="{265266E8-B628-4641-AF38-86C61CFBC6E8}" type="sibTrans" cxnId="{EF358AFE-C887-4F32-A138-762069FFB118}">
+      <dgm:prSet/>
+      <dgm:spPr/>
+      <dgm:t>
+        <a:bodyPr/>
+        <a:lstStyle/>
+        <a:p>
+          <a:endParaRPr lang="en-IN"/>
+        </a:p>
+      </dgm:t>
+    </dgm:pt>
+    <dgm:pt modelId="{924345C8-548C-42F9-9038-809466137207}">
+      <dgm:prSet phldrT="[Text]"/>
+      <dgm:spPr/>
+      <dgm:t>
+        <a:bodyPr/>
+        <a:lstStyle/>
+        <a:p>
+          <a:r>
+            <a:rPr lang="en-IN" dirty="0"/>
+            <a:t>Statistical tests</a:t>
+          </a:r>
+        </a:p>
+      </dgm:t>
+    </dgm:pt>
+    <dgm:pt modelId="{6D903541-63D2-483E-AFF1-457784F29F62}" type="parTrans" cxnId="{01557B17-2AC1-42CB-9B1B-8F52C6DE6578}">
+      <dgm:prSet/>
+      <dgm:spPr/>
+      <dgm:t>
+        <a:bodyPr/>
+        <a:lstStyle/>
+        <a:p>
+          <a:endParaRPr lang="en-IN"/>
+        </a:p>
+      </dgm:t>
+    </dgm:pt>
+    <dgm:pt modelId="{A502BDD9-648C-4854-B585-61D49C62C56A}" type="sibTrans" cxnId="{01557B17-2AC1-42CB-9B1B-8F52C6DE6578}">
+      <dgm:prSet/>
+      <dgm:spPr/>
+      <dgm:t>
+        <a:bodyPr/>
+        <a:lstStyle/>
+        <a:p>
+          <a:endParaRPr lang="en-IN"/>
+        </a:p>
+      </dgm:t>
+    </dgm:pt>
     <dgm:pt modelId="{DBE36D18-8F81-4A90-B0A8-C898FC1DF993}" type="pres">
       <dgm:prSet presAssocID="{61E1D4B5-16F8-45A9-8846-0462DD05B9A8}" presName="vert0" presStyleCnt="0">
         <dgm:presLayoutVars>
@@ -3066,7 +3138,7 @@
       <dgm:spPr/>
     </dgm:pt>
     <dgm:pt modelId="{ED24C99C-041B-4A18-A390-31046E1A500B}" type="pres">
-      <dgm:prSet presAssocID="{CE4F871D-A71B-44F0-BF4D-ADBE436046CD}" presName="tx1" presStyleLbl="revTx" presStyleIdx="0" presStyleCnt="10"/>
+      <dgm:prSet presAssocID="{CE4F871D-A71B-44F0-BF4D-ADBE436046CD}" presName="tx1" presStyleLbl="revTx" presStyleIdx="0" presStyleCnt="12"/>
       <dgm:spPr/>
     </dgm:pt>
     <dgm:pt modelId="{5F6E8188-5150-44B5-AF06-DD727397032E}" type="pres">
@@ -3086,7 +3158,7 @@
       <dgm:spPr/>
     </dgm:pt>
     <dgm:pt modelId="{941753AE-B722-471C-AC62-47319BF0C8D9}" type="pres">
-      <dgm:prSet presAssocID="{CBA260BE-26DF-4CA2-8529-0EA2431A5CF2}" presName="tx2" presStyleLbl="revTx" presStyleIdx="1" presStyleCnt="10"/>
+      <dgm:prSet presAssocID="{CBA260BE-26DF-4CA2-8529-0EA2431A5CF2}" presName="tx2" presStyleLbl="revTx" presStyleIdx="1" presStyleCnt="12"/>
       <dgm:spPr/>
     </dgm:pt>
     <dgm:pt modelId="{4732C1CE-1D2A-42E0-B848-CA52ABBFF090}" type="pres">
@@ -3102,7 +3174,7 @@
       <dgm:spPr/>
     </dgm:pt>
     <dgm:pt modelId="{5985B81B-530D-4971-88A2-3EE4ECBB8E69}" type="pres">
-      <dgm:prSet presAssocID="{3E3F56BA-E945-4C66-9B60-F0E8F28D2E92}" presName="tx3" presStyleLbl="revTx" presStyleIdx="2" presStyleCnt="10"/>
+      <dgm:prSet presAssocID="{3E3F56BA-E945-4C66-9B60-F0E8F28D2E92}" presName="tx3" presStyleLbl="revTx" presStyleIdx="2" presStyleCnt="12"/>
       <dgm:spPr/>
     </dgm:pt>
     <dgm:pt modelId="{BDDFD716-F8B6-48AF-9B75-26DCD52D9B88}" type="pres">
@@ -3110,7 +3182,7 @@
       <dgm:spPr/>
     </dgm:pt>
     <dgm:pt modelId="{FF831E13-8A6A-4D8A-BEB7-37ADC62306D4}" type="pres">
-      <dgm:prSet presAssocID="{03BAC815-F445-4298-8795-7F458AF95EAB}" presName="thinLine3" presStyleLbl="callout" presStyleIdx="0" presStyleCnt="8"/>
+      <dgm:prSet presAssocID="{03BAC815-F445-4298-8795-7F458AF95EAB}" presName="thinLine3" presStyleLbl="callout" presStyleIdx="0" presStyleCnt="9"/>
       <dgm:spPr/>
     </dgm:pt>
     <dgm:pt modelId="{10B32927-D3B3-48A4-89FB-0AB3A78CDFAE}" type="pres">
@@ -3122,7 +3194,7 @@
       <dgm:spPr/>
     </dgm:pt>
     <dgm:pt modelId="{0AFF7BF0-831D-4AD1-ABB4-F764DB6E2461}" type="pres">
-      <dgm:prSet presAssocID="{B3A68995-F847-415E-9A04-D56AE9162ADF}" presName="tx3" presStyleLbl="revTx" presStyleIdx="3" presStyleCnt="10"/>
+      <dgm:prSet presAssocID="{B3A68995-F847-415E-9A04-D56AE9162ADF}" presName="tx3" presStyleLbl="revTx" presStyleIdx="3" presStyleCnt="12"/>
       <dgm:spPr/>
     </dgm:pt>
     <dgm:pt modelId="{2ABCD0F3-8ABE-4480-8A72-96EBD37CA65B}" type="pres">
@@ -3130,7 +3202,7 @@
       <dgm:spPr/>
     </dgm:pt>
     <dgm:pt modelId="{D07F289D-12CB-40AB-A857-CA247E25A06F}" type="pres">
-      <dgm:prSet presAssocID="{C1A08A78-397D-4E34-9278-8DBCD68C51D1}" presName="thinLine3" presStyleLbl="callout" presStyleIdx="1" presStyleCnt="8"/>
+      <dgm:prSet presAssocID="{C1A08A78-397D-4E34-9278-8DBCD68C51D1}" presName="thinLine3" presStyleLbl="callout" presStyleIdx="1" presStyleCnt="9"/>
       <dgm:spPr/>
     </dgm:pt>
     <dgm:pt modelId="{8A6A3BB5-8B4B-4B34-B5D4-DFF9A1435579}" type="pres">
@@ -3142,7 +3214,7 @@
       <dgm:spPr/>
     </dgm:pt>
     <dgm:pt modelId="{4D62E9A6-E659-40CA-98AB-B285AFE75633}" type="pres">
-      <dgm:prSet presAssocID="{8CA005AC-9806-438A-9F46-92E1C8CC58D6}" presName="tx3" presStyleLbl="revTx" presStyleIdx="4" presStyleCnt="10"/>
+      <dgm:prSet presAssocID="{8CA005AC-9806-438A-9F46-92E1C8CC58D6}" presName="tx3" presStyleLbl="revTx" presStyleIdx="4" presStyleCnt="12"/>
       <dgm:spPr/>
     </dgm:pt>
     <dgm:pt modelId="{7F0641B9-10BB-443B-B35F-74B597647C5A}" type="pres">
@@ -3150,7 +3222,7 @@
       <dgm:spPr/>
     </dgm:pt>
     <dgm:pt modelId="{52EA843E-06A3-42D1-8C01-BD7D1EC5A7E2}" type="pres">
-      <dgm:prSet presAssocID="{C23A1E79-72BF-407F-A21E-0D3BAB90FC0D}" presName="thinLine3" presStyleLbl="callout" presStyleIdx="2" presStyleCnt="8"/>
+      <dgm:prSet presAssocID="{C23A1E79-72BF-407F-A21E-0D3BAB90FC0D}" presName="thinLine3" presStyleLbl="callout" presStyleIdx="2" presStyleCnt="9"/>
       <dgm:spPr/>
     </dgm:pt>
     <dgm:pt modelId="{9436CA0A-483E-4766-9945-CBD7C132CD1C}" type="pres">
@@ -3162,7 +3234,7 @@
       <dgm:spPr/>
     </dgm:pt>
     <dgm:pt modelId="{68706D7E-EE3E-4DDF-9022-D931030632D4}" type="pres">
-      <dgm:prSet presAssocID="{2010375B-7E0E-48B7-92CE-101C20197BC6}" presName="tx3" presStyleLbl="revTx" presStyleIdx="5" presStyleCnt="10"/>
+      <dgm:prSet presAssocID="{2010375B-7E0E-48B7-92CE-101C20197BC6}" presName="tx3" presStyleLbl="revTx" presStyleIdx="5" presStyleCnt="12"/>
       <dgm:spPr/>
     </dgm:pt>
     <dgm:pt modelId="{1F318117-DE1E-4C9E-A093-0CE01050CB9A}" type="pres">
@@ -3170,7 +3242,7 @@
       <dgm:spPr/>
     </dgm:pt>
     <dgm:pt modelId="{F7F3A5D0-D057-468A-B24E-9B2BE81D8CF2}" type="pres">
-      <dgm:prSet presAssocID="{35563C7F-05DC-40BD-B9D1-F74B6E93132C}" presName="thinLine3" presStyleLbl="callout" presStyleIdx="3" presStyleCnt="8"/>
+      <dgm:prSet presAssocID="{35563C7F-05DC-40BD-B9D1-F74B6E93132C}" presName="thinLine3" presStyleLbl="callout" presStyleIdx="3" presStyleCnt="9"/>
       <dgm:spPr/>
     </dgm:pt>
     <dgm:pt modelId="{2EF3347C-13D6-48EF-869B-A39E7EA65A9B}" type="pres">
@@ -3182,7 +3254,7 @@
       <dgm:spPr/>
     </dgm:pt>
     <dgm:pt modelId="{643E397E-2DA9-48E1-A4BE-33184935FB21}" type="pres">
-      <dgm:prSet presAssocID="{DD18E9A5-E7C3-4370-8339-4913E591CDBA}" presName="tx3" presStyleLbl="revTx" presStyleIdx="6" presStyleCnt="10"/>
+      <dgm:prSet presAssocID="{DD18E9A5-E7C3-4370-8339-4913E591CDBA}" presName="tx3" presStyleLbl="revTx" presStyleIdx="6" presStyleCnt="12"/>
       <dgm:spPr/>
     </dgm:pt>
     <dgm:pt modelId="{8A0FEAB5-F80C-484C-8CFD-E580693C3BE4}" type="pres">
@@ -3190,7 +3262,7 @@
       <dgm:spPr/>
     </dgm:pt>
     <dgm:pt modelId="{3BC7DEBA-2C52-4028-89DE-F5AB3FE4CB76}" type="pres">
-      <dgm:prSet presAssocID="{CBA260BE-26DF-4CA2-8529-0EA2431A5CF2}" presName="thinLine2b" presStyleLbl="callout" presStyleIdx="4" presStyleCnt="8"/>
+      <dgm:prSet presAssocID="{CBA260BE-26DF-4CA2-8529-0EA2431A5CF2}" presName="thinLine2b" presStyleLbl="callout" presStyleIdx="4" presStyleCnt="9"/>
       <dgm:spPr/>
     </dgm:pt>
     <dgm:pt modelId="{6687F389-4EDE-4A18-8963-0DDC2732DB2A}" type="pres">
@@ -3206,15 +3278,51 @@
       <dgm:spPr/>
     </dgm:pt>
     <dgm:pt modelId="{193F5734-4D54-4AF1-9A12-3B2325B908A1}" type="pres">
-      <dgm:prSet presAssocID="{895FDE64-0A3D-4ED9-99A2-22F3494EF53D}" presName="tx2" presStyleLbl="revTx" presStyleIdx="7" presStyleCnt="10"/>
+      <dgm:prSet presAssocID="{895FDE64-0A3D-4ED9-99A2-22F3494EF53D}" presName="tx2" presStyleLbl="revTx" presStyleIdx="7" presStyleCnt="12"/>
       <dgm:spPr/>
     </dgm:pt>
     <dgm:pt modelId="{FE67E293-4F22-4B7C-99DC-F92B634FD3E3}" type="pres">
       <dgm:prSet presAssocID="{895FDE64-0A3D-4ED9-99A2-22F3494EF53D}" presName="vert2" presStyleCnt="0"/>
       <dgm:spPr/>
     </dgm:pt>
+    <dgm:pt modelId="{31E15C18-2C2D-4FC9-8399-222A0ABCBFB2}" type="pres">
+      <dgm:prSet presAssocID="{13C68548-78D4-42EB-8A4E-355ADF5DB3ED}" presName="horz3" presStyleCnt="0"/>
+      <dgm:spPr/>
+    </dgm:pt>
+    <dgm:pt modelId="{876EC87B-5A0B-4D57-9D75-4EAA474AEE22}" type="pres">
+      <dgm:prSet presAssocID="{13C68548-78D4-42EB-8A4E-355ADF5DB3ED}" presName="horzSpace3" presStyleCnt="0"/>
+      <dgm:spPr/>
+    </dgm:pt>
+    <dgm:pt modelId="{928F2C93-E1BA-4337-99D6-D12DC92E91EF}" type="pres">
+      <dgm:prSet presAssocID="{13C68548-78D4-42EB-8A4E-355ADF5DB3ED}" presName="tx3" presStyleLbl="revTx" presStyleIdx="8" presStyleCnt="12"/>
+      <dgm:spPr/>
+    </dgm:pt>
+    <dgm:pt modelId="{FC499929-1754-457D-B6F5-0622B8DEEEE7}" type="pres">
+      <dgm:prSet presAssocID="{13C68548-78D4-42EB-8A4E-355ADF5DB3ED}" presName="vert3" presStyleCnt="0"/>
+      <dgm:spPr/>
+    </dgm:pt>
+    <dgm:pt modelId="{8C9FE8B8-DC11-4721-942D-905655C00CE9}" type="pres">
+      <dgm:prSet presAssocID="{265266E8-B628-4641-AF38-86C61CFBC6E8}" presName="thinLine3" presStyleLbl="callout" presStyleIdx="5" presStyleCnt="9"/>
+      <dgm:spPr/>
+    </dgm:pt>
+    <dgm:pt modelId="{1EFA7EFA-3863-4F57-93C1-BC47CDEEAD9B}" type="pres">
+      <dgm:prSet presAssocID="{924345C8-548C-42F9-9038-809466137207}" presName="horz3" presStyleCnt="0"/>
+      <dgm:spPr/>
+    </dgm:pt>
+    <dgm:pt modelId="{2AE3E8FA-93F4-4138-98B4-AC7016DA4632}" type="pres">
+      <dgm:prSet presAssocID="{924345C8-548C-42F9-9038-809466137207}" presName="horzSpace3" presStyleCnt="0"/>
+      <dgm:spPr/>
+    </dgm:pt>
+    <dgm:pt modelId="{99B615F0-8139-4359-949E-2A2A37E2D3AF}" type="pres">
+      <dgm:prSet presAssocID="{924345C8-548C-42F9-9038-809466137207}" presName="tx3" presStyleLbl="revTx" presStyleIdx="9" presStyleCnt="12"/>
+      <dgm:spPr/>
+    </dgm:pt>
+    <dgm:pt modelId="{D1680275-7FEE-4984-83F2-502D7902F368}" type="pres">
+      <dgm:prSet presAssocID="{924345C8-548C-42F9-9038-809466137207}" presName="vert3" presStyleCnt="0"/>
+      <dgm:spPr/>
+    </dgm:pt>
     <dgm:pt modelId="{C4D9330B-F04D-412D-BB13-2F067C2A29DD}" type="pres">
-      <dgm:prSet presAssocID="{895FDE64-0A3D-4ED9-99A2-22F3494EF53D}" presName="thinLine2b" presStyleLbl="callout" presStyleIdx="5" presStyleCnt="8"/>
+      <dgm:prSet presAssocID="{895FDE64-0A3D-4ED9-99A2-22F3494EF53D}" presName="thinLine2b" presStyleLbl="callout" presStyleIdx="6" presStyleCnt="9"/>
       <dgm:spPr/>
     </dgm:pt>
     <dgm:pt modelId="{F26B21B8-D985-4CBF-9F2B-E41358727437}" type="pres">
@@ -3230,7 +3338,7 @@
       <dgm:spPr/>
     </dgm:pt>
     <dgm:pt modelId="{E6DD7986-8B2F-4F73-B9F8-EFD41E23A411}" type="pres">
-      <dgm:prSet presAssocID="{223896C4-B813-411E-AA10-D364E146F37F}" presName="tx2" presStyleLbl="revTx" presStyleIdx="8" presStyleCnt="10"/>
+      <dgm:prSet presAssocID="{223896C4-B813-411E-AA10-D364E146F37F}" presName="tx2" presStyleLbl="revTx" presStyleIdx="10" presStyleCnt="12"/>
       <dgm:spPr/>
     </dgm:pt>
     <dgm:pt modelId="{7D6A553D-A345-4D63-9B5F-FD27FE0B5989}" type="pres">
@@ -3238,7 +3346,7 @@
       <dgm:spPr/>
     </dgm:pt>
     <dgm:pt modelId="{3AB6591B-587F-4DA3-830A-8A2EE4E8CC7C}" type="pres">
-      <dgm:prSet presAssocID="{223896C4-B813-411E-AA10-D364E146F37F}" presName="thinLine2b" presStyleLbl="callout" presStyleIdx="6" presStyleCnt="8"/>
+      <dgm:prSet presAssocID="{223896C4-B813-411E-AA10-D364E146F37F}" presName="thinLine2b" presStyleLbl="callout" presStyleIdx="7" presStyleCnt="9"/>
       <dgm:spPr/>
     </dgm:pt>
     <dgm:pt modelId="{E38FA96F-C0A1-4A7C-A71D-01633D2311B5}" type="pres">
@@ -3254,7 +3362,7 @@
       <dgm:spPr/>
     </dgm:pt>
     <dgm:pt modelId="{96066DCF-1020-4B1B-9719-3F5253BDEE75}" type="pres">
-      <dgm:prSet presAssocID="{622FB042-93C9-4D86-B7FA-E9E21540A62D}" presName="tx2" presStyleLbl="revTx" presStyleIdx="9" presStyleCnt="10"/>
+      <dgm:prSet presAssocID="{622FB042-93C9-4D86-B7FA-E9E21540A62D}" presName="tx2" presStyleLbl="revTx" presStyleIdx="11" presStyleCnt="12"/>
       <dgm:spPr/>
     </dgm:pt>
     <dgm:pt modelId="{D0BFBA78-BED1-4F6E-839D-61A108ED98F4}" type="pres">
@@ -3262,7 +3370,7 @@
       <dgm:spPr/>
     </dgm:pt>
     <dgm:pt modelId="{DA6A172D-C8EF-4EEE-8A72-71BE97162571}" type="pres">
-      <dgm:prSet presAssocID="{622FB042-93C9-4D86-B7FA-E9E21540A62D}" presName="thinLine2b" presStyleLbl="callout" presStyleIdx="7" presStyleCnt="8"/>
+      <dgm:prSet presAssocID="{622FB042-93C9-4D86-B7FA-E9E21540A62D}" presName="thinLine2b" presStyleLbl="callout" presStyleIdx="8" presStyleCnt="9"/>
       <dgm:spPr/>
     </dgm:pt>
     <dgm:pt modelId="{649FDDD9-97F5-45EE-A659-92652CA50EAA}" type="pres">
@@ -3271,7 +3379,9 @@
     </dgm:pt>
   </dgm:ptLst>
   <dgm:cxnLst>
+    <dgm:cxn modelId="{01557B17-2AC1-42CB-9B1B-8F52C6DE6578}" srcId="{895FDE64-0A3D-4ED9-99A2-22F3494EF53D}" destId="{924345C8-548C-42F9-9038-809466137207}" srcOrd="1" destOrd="0" parTransId="{6D903541-63D2-483E-AFF1-457784F29F62}" sibTransId="{A502BDD9-648C-4854-B585-61D49C62C56A}"/>
     <dgm:cxn modelId="{C1DEAB2D-0DC0-4AC5-9567-560E072D78C5}" srcId="{CE4F871D-A71B-44F0-BF4D-ADBE436046CD}" destId="{CBA260BE-26DF-4CA2-8529-0EA2431A5CF2}" srcOrd="0" destOrd="0" parTransId="{CB77379E-E454-4AB6-B4F6-9809E81F1C07}" sibTransId="{16F432DB-7927-41EF-BB22-22E34CAA75C4}"/>
+    <dgm:cxn modelId="{0FB79D30-399D-456D-A0A2-584E054BF617}" type="presOf" srcId="{13C68548-78D4-42EB-8A4E-355ADF5DB3ED}" destId="{928F2C93-E1BA-4337-99D6-D12DC92E91EF}" srcOrd="0" destOrd="0" presId="urn:microsoft.com/office/officeart/2008/layout/LinedList"/>
     <dgm:cxn modelId="{29DD1C33-9CD9-4748-9081-1BE1A34FE693}" srcId="{CE4F871D-A71B-44F0-BF4D-ADBE436046CD}" destId="{895FDE64-0A3D-4ED9-99A2-22F3494EF53D}" srcOrd="1" destOrd="0" parTransId="{E6351690-2566-4896-925C-CB81592ED6B5}" sibTransId="{03EB069B-6693-4EBB-88FC-AC57482BBF1D}"/>
     <dgm:cxn modelId="{30193B3C-D79B-424F-9B17-0C7ED608A7CA}" type="presOf" srcId="{3E3F56BA-E945-4C66-9B60-F0E8F28D2E92}" destId="{5985B81B-530D-4971-88A2-3EE4ECBB8E69}" srcOrd="0" destOrd="0" presId="urn:microsoft.com/office/officeart/2008/layout/LinedList"/>
     <dgm:cxn modelId="{1D85B35D-0703-4A36-B4D0-0896959907FA}" type="presOf" srcId="{61E1D4B5-16F8-45A9-8846-0462DD05B9A8}" destId="{DBE36D18-8F81-4A90-B0A8-C898FC1DF993}" srcOrd="0" destOrd="0" presId="urn:microsoft.com/office/officeart/2008/layout/LinedList"/>
@@ -3280,6 +3390,7 @@
     <dgm:cxn modelId="{A4CCCE49-A803-446E-A9FB-CAA75818963C}" srcId="{CBA260BE-26DF-4CA2-8529-0EA2431A5CF2}" destId="{3E3F56BA-E945-4C66-9B60-F0E8F28D2E92}" srcOrd="0" destOrd="0" parTransId="{F55D23B3-5007-4311-A364-424A30F190DF}" sibTransId="{03BAC815-F445-4298-8795-7F458AF95EAB}"/>
     <dgm:cxn modelId="{06CE096C-89DF-4BBF-9B16-2C6C278753B6}" type="presOf" srcId="{223896C4-B813-411E-AA10-D364E146F37F}" destId="{E6DD7986-8B2F-4F73-B9F8-EFD41E23A411}" srcOrd="0" destOrd="0" presId="urn:microsoft.com/office/officeart/2008/layout/LinedList"/>
     <dgm:cxn modelId="{531D9984-1A54-4284-8A1B-77479CCFE8B5}" srcId="{CE4F871D-A71B-44F0-BF4D-ADBE436046CD}" destId="{622FB042-93C9-4D86-B7FA-E9E21540A62D}" srcOrd="3" destOrd="0" parTransId="{44AA8F2A-F5EC-4AA7-A241-65CF8255CA7C}" sibTransId="{1DE1EBDF-3919-4AAD-A8BD-724BA2716405}"/>
+    <dgm:cxn modelId="{B5BAC29A-35D9-4A0D-B607-CC9AF0544D97}" type="presOf" srcId="{924345C8-548C-42F9-9038-809466137207}" destId="{99B615F0-8139-4359-949E-2A2A37E2D3AF}" srcOrd="0" destOrd="0" presId="urn:microsoft.com/office/officeart/2008/layout/LinedList"/>
     <dgm:cxn modelId="{2A6264A3-0C09-4CD4-A5AC-7967CBB5E98A}" type="presOf" srcId="{2010375B-7E0E-48B7-92CE-101C20197BC6}" destId="{68706D7E-EE3E-4DDF-9022-D931030632D4}" srcOrd="0" destOrd="0" presId="urn:microsoft.com/office/officeart/2008/layout/LinedList"/>
     <dgm:cxn modelId="{A820C2B5-2779-4312-8790-14FF6F32800C}" srcId="{61E1D4B5-16F8-45A9-8846-0462DD05B9A8}" destId="{CE4F871D-A71B-44F0-BF4D-ADBE436046CD}" srcOrd="0" destOrd="0" parTransId="{BA0137A8-DBE0-448F-A6DC-4EF9DE3EF2C1}" sibTransId="{BCB421C9-CD8A-4323-9A2E-04336F05DB64}"/>
     <dgm:cxn modelId="{112792B8-4279-4462-824F-094952E7EA53}" type="presOf" srcId="{CBA260BE-26DF-4CA2-8529-0EA2431A5CF2}" destId="{941753AE-B722-471C-AC62-47319BF0C8D9}" srcOrd="0" destOrd="0" presId="urn:microsoft.com/office/officeart/2008/layout/LinedList"/>
@@ -3292,6 +3403,7 @@
     <dgm:cxn modelId="{A1AE47D0-AD69-449C-8E61-79CDFE26499D}" type="presOf" srcId="{CE4F871D-A71B-44F0-BF4D-ADBE436046CD}" destId="{ED24C99C-041B-4A18-A390-31046E1A500B}" srcOrd="0" destOrd="0" presId="urn:microsoft.com/office/officeart/2008/layout/LinedList"/>
     <dgm:cxn modelId="{666524EC-9AB9-4E20-AF40-F372E47E1AD0}" srcId="{CBA260BE-26DF-4CA2-8529-0EA2431A5CF2}" destId="{2010375B-7E0E-48B7-92CE-101C20197BC6}" srcOrd="3" destOrd="0" parTransId="{82EE0B6E-7E0A-462B-87A3-1EF46B732261}" sibTransId="{35563C7F-05DC-40BD-B9D1-F74B6E93132C}"/>
     <dgm:cxn modelId="{F5FE89F4-33F6-4AC9-9EA2-78404614AB4E}" type="presOf" srcId="{8CA005AC-9806-438A-9F46-92E1C8CC58D6}" destId="{4D62E9A6-E659-40CA-98AB-B285AFE75633}" srcOrd="0" destOrd="0" presId="urn:microsoft.com/office/officeart/2008/layout/LinedList"/>
+    <dgm:cxn modelId="{EF358AFE-C887-4F32-A138-762069FFB118}" srcId="{895FDE64-0A3D-4ED9-99A2-22F3494EF53D}" destId="{13C68548-78D4-42EB-8A4E-355ADF5DB3ED}" srcOrd="0" destOrd="0" parTransId="{FD04A5A8-D653-414C-9CB2-871AD466BB26}" sibTransId="{265266E8-B628-4641-AF38-86C61CFBC6E8}"/>
     <dgm:cxn modelId="{1309D5D4-F691-4726-A0D4-C95E5CF65D46}" type="presParOf" srcId="{DBE36D18-8F81-4A90-B0A8-C898FC1DF993}" destId="{25E56E41-CC86-49E3-A244-93BDA0E88186}" srcOrd="0" destOrd="0" presId="urn:microsoft.com/office/officeart/2008/layout/LinedList"/>
     <dgm:cxn modelId="{174B2E0E-A6F0-46B5-9D6A-6819CD615D17}" type="presParOf" srcId="{DBE36D18-8F81-4A90-B0A8-C898FC1DF993}" destId="{301DC8B6-EBBC-446D-A4DB-06BE186C4770}" srcOrd="1" destOrd="0" presId="urn:microsoft.com/office/officeart/2008/layout/LinedList"/>
     <dgm:cxn modelId="{02A4E509-0869-47E0-9D49-1ED868C8AC2C}" type="presParOf" srcId="{301DC8B6-EBBC-446D-A4DB-06BE186C4770}" destId="{ED24C99C-041B-4A18-A390-31046E1A500B}" srcOrd="0" destOrd="0" presId="urn:microsoft.com/office/officeart/2008/layout/LinedList"/>
@@ -3331,6 +3443,15 @@
     <dgm:cxn modelId="{0D7AA5DF-4138-4C37-8D64-95E534E1A09B}" type="presParOf" srcId="{3FE2DC37-0677-4BE3-9843-1A664C18C8E1}" destId="{6105CDAE-B1C2-41C4-981C-AD8C2807FCCA}" srcOrd="0" destOrd="0" presId="urn:microsoft.com/office/officeart/2008/layout/LinedList"/>
     <dgm:cxn modelId="{A52BC915-3E6B-4008-B6A7-D22D24CD7752}" type="presParOf" srcId="{3FE2DC37-0677-4BE3-9843-1A664C18C8E1}" destId="{193F5734-4D54-4AF1-9A12-3B2325B908A1}" srcOrd="1" destOrd="0" presId="urn:microsoft.com/office/officeart/2008/layout/LinedList"/>
     <dgm:cxn modelId="{DB29F581-2154-4723-9AAE-2DEA0B42E2B1}" type="presParOf" srcId="{3FE2DC37-0677-4BE3-9843-1A664C18C8E1}" destId="{FE67E293-4F22-4B7C-99DC-F92B634FD3E3}" srcOrd="2" destOrd="0" presId="urn:microsoft.com/office/officeart/2008/layout/LinedList"/>
+    <dgm:cxn modelId="{997311A8-3CE8-4732-87B0-DEE28E327A1C}" type="presParOf" srcId="{FE67E293-4F22-4B7C-99DC-F92B634FD3E3}" destId="{31E15C18-2C2D-4FC9-8399-222A0ABCBFB2}" srcOrd="0" destOrd="0" presId="urn:microsoft.com/office/officeart/2008/layout/LinedList"/>
+    <dgm:cxn modelId="{EA8C0988-A126-4A62-B670-DC5033D8B195}" type="presParOf" srcId="{31E15C18-2C2D-4FC9-8399-222A0ABCBFB2}" destId="{876EC87B-5A0B-4D57-9D75-4EAA474AEE22}" srcOrd="0" destOrd="0" presId="urn:microsoft.com/office/officeart/2008/layout/LinedList"/>
+    <dgm:cxn modelId="{FC28C97C-64D0-4258-8815-BFEB56535F80}" type="presParOf" srcId="{31E15C18-2C2D-4FC9-8399-222A0ABCBFB2}" destId="{928F2C93-E1BA-4337-99D6-D12DC92E91EF}" srcOrd="1" destOrd="0" presId="urn:microsoft.com/office/officeart/2008/layout/LinedList"/>
+    <dgm:cxn modelId="{1E65487F-3E08-4458-8256-55F51FB896D8}" type="presParOf" srcId="{31E15C18-2C2D-4FC9-8399-222A0ABCBFB2}" destId="{FC499929-1754-457D-B6F5-0622B8DEEEE7}" srcOrd="2" destOrd="0" presId="urn:microsoft.com/office/officeart/2008/layout/LinedList"/>
+    <dgm:cxn modelId="{A0AFB00D-BA38-47ED-BC29-C5E09B536E1A}" type="presParOf" srcId="{FE67E293-4F22-4B7C-99DC-F92B634FD3E3}" destId="{8C9FE8B8-DC11-4721-942D-905655C00CE9}" srcOrd="1" destOrd="0" presId="urn:microsoft.com/office/officeart/2008/layout/LinedList"/>
+    <dgm:cxn modelId="{17BE6CDB-BE6D-42E4-AA21-371866BD5963}" type="presParOf" srcId="{FE67E293-4F22-4B7C-99DC-F92B634FD3E3}" destId="{1EFA7EFA-3863-4F57-93C1-BC47CDEEAD9B}" srcOrd="2" destOrd="0" presId="urn:microsoft.com/office/officeart/2008/layout/LinedList"/>
+    <dgm:cxn modelId="{01AF452A-5123-44AD-B0A1-C4145045C4F1}" type="presParOf" srcId="{1EFA7EFA-3863-4F57-93C1-BC47CDEEAD9B}" destId="{2AE3E8FA-93F4-4138-98B4-AC7016DA4632}" srcOrd="0" destOrd="0" presId="urn:microsoft.com/office/officeart/2008/layout/LinedList"/>
+    <dgm:cxn modelId="{7C69B2B6-92C3-4132-9A07-7969DD8BB2DD}" type="presParOf" srcId="{1EFA7EFA-3863-4F57-93C1-BC47CDEEAD9B}" destId="{99B615F0-8139-4359-949E-2A2A37E2D3AF}" srcOrd="1" destOrd="0" presId="urn:microsoft.com/office/officeart/2008/layout/LinedList"/>
+    <dgm:cxn modelId="{2751ABCE-DD03-4A93-8E11-6709518329E6}" type="presParOf" srcId="{1EFA7EFA-3863-4F57-93C1-BC47CDEEAD9B}" destId="{D1680275-7FEE-4984-83F2-502D7902F368}" srcOrd="2" destOrd="0" presId="urn:microsoft.com/office/officeart/2008/layout/LinedList"/>
     <dgm:cxn modelId="{E16EC014-F953-4741-A5C2-9BE860F397F3}" type="presParOf" srcId="{5F6E8188-5150-44B5-AF06-DD727397032E}" destId="{C4D9330B-F04D-412D-BB13-2F067C2A29DD}" srcOrd="5" destOrd="0" presId="urn:microsoft.com/office/officeart/2008/layout/LinedList"/>
     <dgm:cxn modelId="{20287E5D-8057-49BD-B888-ADCD96BA7C25}" type="presParOf" srcId="{5F6E8188-5150-44B5-AF06-DD727397032E}" destId="{F26B21B8-D985-4CBF-9F2B-E41358727437}" srcOrd="6" destOrd="0" presId="urn:microsoft.com/office/officeart/2008/layout/LinedList"/>
     <dgm:cxn modelId="{0B3DE333-8D9D-4338-8802-D68C098F6331}" type="presParOf" srcId="{5F6E8188-5150-44B5-AF06-DD727397032E}" destId="{2A7A61A0-EC64-4E7D-A54E-DEE840D65C3B}" srcOrd="7" destOrd="0" presId="urn:microsoft.com/office/officeart/2008/layout/LinedList"/>
@@ -4982,6 +5103,174 @@
       <dsp:txXfrm>
         <a:off x="1209171" y="1075605"/>
         <a:ext cx="2165260" cy="977823"/>
+      </dsp:txXfrm>
+    </dsp:sp>
+    <dsp:sp modelId="{928F2C93-E1BA-4337-99D6-D12DC92E91EF}">
+      <dsp:nvSpPr>
+        <dsp:cNvPr id="0" name=""/>
+        <dsp:cNvSpPr/>
+      </dsp:nvSpPr>
+      <dsp:spPr>
+        <a:xfrm>
+          <a:off x="3458791" y="1075605"/>
+          <a:ext cx="2165260" cy="488911"/>
+        </a:xfrm>
+        <a:prstGeom prst="rect">
+          <a:avLst/>
+        </a:prstGeom>
+        <a:noFill/>
+        <a:ln>
+          <a:noFill/>
+        </a:ln>
+        <a:effectLst/>
+      </dsp:spPr>
+      <dsp:style>
+        <a:lnRef idx="0">
+          <a:scrgbClr r="0" g="0" b="0"/>
+        </a:lnRef>
+        <a:fillRef idx="0">
+          <a:scrgbClr r="0" g="0" b="0"/>
+        </a:fillRef>
+        <a:effectRef idx="0">
+          <a:scrgbClr r="0" g="0" b="0"/>
+        </a:effectRef>
+        <a:fontRef idx="minor"/>
+      </dsp:style>
+      <dsp:txBody>
+        <a:bodyPr spcFirstLastPara="0" vert="horz" wrap="square" lIns="34290" tIns="34290" rIns="34290" bIns="34290" numCol="1" spcCol="1270" anchor="t" anchorCtr="0">
+          <a:noAutofit/>
+        </a:bodyPr>
+        <a:lstStyle/>
+        <a:p>
+          <a:pPr marL="0" lvl="0" indent="0" algn="l" defTabSz="400050">
+            <a:lnSpc>
+              <a:spcPct val="90000"/>
+            </a:lnSpc>
+            <a:spcBef>
+              <a:spcPct val="0"/>
+            </a:spcBef>
+            <a:spcAft>
+              <a:spcPct val="35000"/>
+            </a:spcAft>
+            <a:buNone/>
+          </a:pPr>
+          <a:r>
+            <a:rPr lang="en-IN" sz="900" kern="1200" dirty="0"/>
+            <a:t>Graphs and Plots</a:t>
+          </a:r>
+        </a:p>
+      </dsp:txBody>
+      <dsp:txXfrm>
+        <a:off x="3458791" y="1075605"/>
+        <a:ext cx="2165260" cy="488911"/>
+      </dsp:txXfrm>
+    </dsp:sp>
+    <dsp:sp modelId="{8C9FE8B8-DC11-4721-942D-905655C00CE9}">
+      <dsp:nvSpPr>
+        <dsp:cNvPr id="0" name=""/>
+        <dsp:cNvSpPr/>
+      </dsp:nvSpPr>
+      <dsp:spPr>
+        <a:xfrm>
+          <a:off x="3374431" y="1564516"/>
+          <a:ext cx="2165260" cy="0"/>
+        </a:xfrm>
+        <a:prstGeom prst="line">
+          <a:avLst/>
+        </a:prstGeom>
+        <a:solidFill>
+          <a:schemeClr val="accent1">
+            <a:hueOff val="0"/>
+            <a:satOff val="0"/>
+            <a:lumOff val="0"/>
+            <a:alphaOff val="0"/>
+          </a:schemeClr>
+        </a:solidFill>
+        <a:ln w="15875" cap="flat" cmpd="sng" algn="ctr">
+          <a:solidFill>
+            <a:schemeClr val="accent1">
+              <a:tint val="50000"/>
+              <a:hueOff val="0"/>
+              <a:satOff val="0"/>
+              <a:lumOff val="0"/>
+              <a:alphaOff val="0"/>
+            </a:schemeClr>
+          </a:solidFill>
+          <a:prstDash val="solid"/>
+        </a:ln>
+        <a:effectLst/>
+      </dsp:spPr>
+      <dsp:style>
+        <a:lnRef idx="2">
+          <a:scrgbClr r="0" g="0" b="0"/>
+        </a:lnRef>
+        <a:fillRef idx="1">
+          <a:scrgbClr r="0" g="0" b="0"/>
+        </a:fillRef>
+        <a:effectRef idx="0">
+          <a:scrgbClr r="0" g="0" b="0"/>
+        </a:effectRef>
+        <a:fontRef idx="minor"/>
+      </dsp:style>
+    </dsp:sp>
+    <dsp:sp modelId="{99B615F0-8139-4359-949E-2A2A37E2D3AF}">
+      <dsp:nvSpPr>
+        <dsp:cNvPr id="0" name=""/>
+        <dsp:cNvSpPr/>
+      </dsp:nvSpPr>
+      <dsp:spPr>
+        <a:xfrm>
+          <a:off x="3458791" y="1564516"/>
+          <a:ext cx="2165260" cy="488911"/>
+        </a:xfrm>
+        <a:prstGeom prst="rect">
+          <a:avLst/>
+        </a:prstGeom>
+        <a:noFill/>
+        <a:ln>
+          <a:noFill/>
+        </a:ln>
+        <a:effectLst/>
+      </dsp:spPr>
+      <dsp:style>
+        <a:lnRef idx="0">
+          <a:scrgbClr r="0" g="0" b="0"/>
+        </a:lnRef>
+        <a:fillRef idx="0">
+          <a:scrgbClr r="0" g="0" b="0"/>
+        </a:fillRef>
+        <a:effectRef idx="0">
+          <a:scrgbClr r="0" g="0" b="0"/>
+        </a:effectRef>
+        <a:fontRef idx="minor"/>
+      </dsp:style>
+      <dsp:txBody>
+        <a:bodyPr spcFirstLastPara="0" vert="horz" wrap="square" lIns="34290" tIns="34290" rIns="34290" bIns="34290" numCol="1" spcCol="1270" anchor="t" anchorCtr="0">
+          <a:noAutofit/>
+        </a:bodyPr>
+        <a:lstStyle/>
+        <a:p>
+          <a:pPr marL="0" lvl="0" indent="0" algn="l" defTabSz="400050">
+            <a:lnSpc>
+              <a:spcPct val="90000"/>
+            </a:lnSpc>
+            <a:spcBef>
+              <a:spcPct val="0"/>
+            </a:spcBef>
+            <a:spcAft>
+              <a:spcPct val="35000"/>
+            </a:spcAft>
+            <a:buNone/>
+          </a:pPr>
+          <a:r>
+            <a:rPr lang="en-IN" sz="900" kern="1200" dirty="0"/>
+            <a:t>Statistical tests</a:t>
+          </a:r>
+        </a:p>
+      </dsp:txBody>
+      <dsp:txXfrm>
+        <a:off x="3458791" y="1564516"/>
+        <a:ext cx="2165260" cy="488911"/>
       </dsp:txXfrm>
     </dsp:sp>
     <dsp:sp modelId="{C4D9330B-F04D-412D-BB13-2F067C2A29DD}">
@@ -33798,7 +34087,7 @@
           <p:nvPr>
             <p:extLst>
               <p:ext uri="{D42A27DB-BD31-4B8C-83A1-F6EECF244321}">
-                <p14:modId xmlns:p14="http://schemas.microsoft.com/office/powerpoint/2010/main" val="3290975418"/>
+                <p14:modId xmlns:p14="http://schemas.microsoft.com/office/powerpoint/2010/main" val="1641799041"/>
               </p:ext>
             </p:extLst>
           </p:nvPr>
@@ -33906,6 +34195,36 @@
           <a:chExt cx="0" cy="0"/>
         </a:xfrm>
       </p:grpSpPr>
+      <p:pic>
+        <p:nvPicPr>
+          <p:cNvPr id="8" name="Picture 7">
+            <a:extLst>
+              <a:ext uri="{FF2B5EF4-FFF2-40B4-BE49-F238E27FC236}">
+                <a16:creationId xmlns:a16="http://schemas.microsoft.com/office/drawing/2014/main" id="{0401C6D5-03F5-1F5F-0308-85738DD42552}"/>
+              </a:ext>
+            </a:extLst>
+          </p:cNvPr>
+          <p:cNvPicPr>
+            <a:picLocks noChangeAspect="1"/>
+          </p:cNvPicPr>
+          <p:nvPr/>
+        </p:nvPicPr>
+        <p:blipFill>
+          <a:blip r:embed="rId2"/>
+          <a:stretch>
+            <a:fillRect/>
+          </a:stretch>
+        </p:blipFill>
+        <p:spPr>
+          <a:xfrm>
+            <a:off x="1024126" y="3312793"/>
+            <a:ext cx="4000158" cy="3534873"/>
+          </a:xfrm>
+          <a:prstGeom prst="rect">
+            <a:avLst/>
+          </a:prstGeom>
+        </p:spPr>
+      </p:pic>
       <p:sp>
         <p:nvSpPr>
           <p:cNvPr id="2" name="Title 1">
@@ -33990,36 +34309,6 @@
           </a:p>
         </p:txBody>
       </p:sp>
-      <p:pic>
-        <p:nvPicPr>
-          <p:cNvPr id="4" name="Picture 3">
-            <a:extLst>
-              <a:ext uri="{FF2B5EF4-FFF2-40B4-BE49-F238E27FC236}">
-                <a16:creationId xmlns:a16="http://schemas.microsoft.com/office/drawing/2014/main" id="{F508196F-0B74-2197-F17F-AE86AE5F61D0}"/>
-              </a:ext>
-            </a:extLst>
-          </p:cNvPr>
-          <p:cNvPicPr>
-            <a:picLocks noChangeAspect="1"/>
-          </p:cNvPicPr>
-          <p:nvPr/>
-        </p:nvPicPr>
-        <p:blipFill>
-          <a:blip r:embed="rId2"/>
-          <a:stretch>
-            <a:fillRect/>
-          </a:stretch>
-        </p:blipFill>
-        <p:spPr>
-          <a:xfrm>
-            <a:off x="881009" y="3318978"/>
-            <a:ext cx="4005623" cy="3539042"/>
-          </a:xfrm>
-          <a:prstGeom prst="rect">
-            <a:avLst/>
-          </a:prstGeom>
-        </p:spPr>
-      </p:pic>
       <p:graphicFrame>
         <p:nvGraphicFramePr>
           <p:cNvPr id="6" name="Table 5">
@@ -36327,12 +36616,19 @@
             <p:ph idx="1"/>
           </p:nvPr>
         </p:nvSpPr>
-        <p:spPr/>
+        <p:spPr>
+          <a:xfrm>
+            <a:off x="1024127" y="1843548"/>
+            <a:ext cx="9720073" cy="4023360"/>
+          </a:xfrm>
+        </p:spPr>
         <p:txBody>
           <a:bodyPr/>
           <a:lstStyle/>
           <a:p>
-            <a:pPr algn="just"/>
+            <a:pPr marL="0" indent="0" algn="just">
+              <a:buNone/>
+            </a:pPr>
             <a:r>
               <a:rPr lang="en-IN" dirty="0"/>
               <a:t>As new data keeps on being added to the model it is important that we keep making sanity checks to make sure that we are getting reasonable predictions.</a:t>

</xml_diff>